<commit_message>
Removed D3.js related files since not needed anymore
</commit_message>
<xml_diff>
--- a/docs/diagrams/SummarySequenceDiagram.pptx
+++ b/docs/diagrams/SummarySequenceDiagram.pptx
@@ -197,7 +197,7 @@
           <a:p>
             <a:fld id="{8CC2A4DC-75EB-46D4-9B4A-352FC9F115CD}" type="datetimeFigureOut">
               <a:rPr lang="en-US" smtClean="0"/>
-              <a:t>4/2/2019</a:t>
+              <a:t>4/13/2019</a:t>
             </a:fld>
             <a:endParaRPr lang="en-US" dirty="0"/>
           </a:p>
@@ -611,7 +611,7 @@
           <a:p>
             <a:fld id="{C17442BA-8611-45A4-B205-589CF9359DD4}" type="datetimeFigureOut">
               <a:rPr lang="en-US" smtClean="0"/>
-              <a:t>4/2/2019</a:t>
+              <a:t>4/13/2019</a:t>
             </a:fld>
             <a:endParaRPr lang="en-US" dirty="0"/>
           </a:p>
@@ -809,7 +809,7 @@
           <a:p>
             <a:fld id="{C17442BA-8611-45A4-B205-589CF9359DD4}" type="datetimeFigureOut">
               <a:rPr lang="en-US" smtClean="0"/>
-              <a:t>4/2/2019</a:t>
+              <a:t>4/13/2019</a:t>
             </a:fld>
             <a:endParaRPr lang="en-US" dirty="0"/>
           </a:p>
@@ -1017,7 +1017,7 @@
           <a:p>
             <a:fld id="{C17442BA-8611-45A4-B205-589CF9359DD4}" type="datetimeFigureOut">
               <a:rPr lang="en-US" smtClean="0"/>
-              <a:t>4/2/2019</a:t>
+              <a:t>4/13/2019</a:t>
             </a:fld>
             <a:endParaRPr lang="en-US" dirty="0"/>
           </a:p>
@@ -1215,7 +1215,7 @@
           <a:p>
             <a:fld id="{C17442BA-8611-45A4-B205-589CF9359DD4}" type="datetimeFigureOut">
               <a:rPr lang="en-US" smtClean="0"/>
-              <a:t>4/2/2019</a:t>
+              <a:t>4/13/2019</a:t>
             </a:fld>
             <a:endParaRPr lang="en-US" dirty="0"/>
           </a:p>
@@ -1490,7 +1490,7 @@
           <a:p>
             <a:fld id="{C17442BA-8611-45A4-B205-589CF9359DD4}" type="datetimeFigureOut">
               <a:rPr lang="en-US" smtClean="0"/>
-              <a:t>4/2/2019</a:t>
+              <a:t>4/13/2019</a:t>
             </a:fld>
             <a:endParaRPr lang="en-US" dirty="0"/>
           </a:p>
@@ -1755,7 +1755,7 @@
           <a:p>
             <a:fld id="{C17442BA-8611-45A4-B205-589CF9359DD4}" type="datetimeFigureOut">
               <a:rPr lang="en-US" smtClean="0"/>
-              <a:t>4/2/2019</a:t>
+              <a:t>4/13/2019</a:t>
             </a:fld>
             <a:endParaRPr lang="en-US" dirty="0"/>
           </a:p>
@@ -2167,7 +2167,7 @@
           <a:p>
             <a:fld id="{C17442BA-8611-45A4-B205-589CF9359DD4}" type="datetimeFigureOut">
               <a:rPr lang="en-US" smtClean="0"/>
-              <a:t>4/2/2019</a:t>
+              <a:t>4/13/2019</a:t>
             </a:fld>
             <a:endParaRPr lang="en-US" dirty="0"/>
           </a:p>
@@ -2308,7 +2308,7 @@
           <a:p>
             <a:fld id="{C17442BA-8611-45A4-B205-589CF9359DD4}" type="datetimeFigureOut">
               <a:rPr lang="en-US" smtClean="0"/>
-              <a:t>4/2/2019</a:t>
+              <a:t>4/13/2019</a:t>
             </a:fld>
             <a:endParaRPr lang="en-US" dirty="0"/>
           </a:p>
@@ -2421,7 +2421,7 @@
           <a:p>
             <a:fld id="{C17442BA-8611-45A4-B205-589CF9359DD4}" type="datetimeFigureOut">
               <a:rPr lang="en-US" smtClean="0"/>
-              <a:t>4/2/2019</a:t>
+              <a:t>4/13/2019</a:t>
             </a:fld>
             <a:endParaRPr lang="en-US" dirty="0"/>
           </a:p>
@@ -2732,7 +2732,7 @@
           <a:p>
             <a:fld id="{C17442BA-8611-45A4-B205-589CF9359DD4}" type="datetimeFigureOut">
               <a:rPr lang="en-US" smtClean="0"/>
-              <a:t>4/2/2019</a:t>
+              <a:t>4/13/2019</a:t>
             </a:fld>
             <a:endParaRPr lang="en-US" dirty="0"/>
           </a:p>
@@ -3020,7 +3020,7 @@
           <a:p>
             <a:fld id="{C17442BA-8611-45A4-B205-589CF9359DD4}" type="datetimeFigureOut">
               <a:rPr lang="en-US" smtClean="0"/>
-              <a:t>4/2/2019</a:t>
+              <a:t>4/13/2019</a:t>
             </a:fld>
             <a:endParaRPr lang="en-US" dirty="0"/>
           </a:p>
@@ -3261,7 +3261,7 @@
           <a:p>
             <a:fld id="{C17442BA-8611-45A4-B205-589CF9359DD4}" type="datetimeFigureOut">
               <a:rPr lang="en-US" smtClean="0"/>
-              <a:t>4/2/2019</a:t>
+              <a:t>4/13/2019</a:t>
             </a:fld>
             <a:endParaRPr lang="en-US" dirty="0"/>
           </a:p>
@@ -3692,8 +3692,8 @@
         </p:nvSpPr>
         <p:spPr>
           <a:xfrm>
-            <a:off x="-406366" y="-1619250"/>
-            <a:ext cx="15284416" cy="11029950"/>
+            <a:off x="465683" y="-1303867"/>
+            <a:ext cx="11260633" cy="9719733"/>
           </a:xfrm>
           <a:prstGeom prst="roundRect">
             <a:avLst>
@@ -3728,9 +3728,9 @@
           <a:bodyPr rtlCol="0" anchor="t"/>
           <a:lstStyle/>
           <a:p>
-            <a:endParaRPr lang="en-SG" sz="1400" b="1" dirty="0">
+            <a:endParaRPr lang="en-SG" sz="1400" dirty="0">
               <a:solidFill>
-                <a:srgbClr val="0070C0"/>
+                <a:srgbClr val="FF0000"/>
               </a:solidFill>
             </a:endParaRPr>
           </a:p>
@@ -3754,7 +3754,7 @@
         </p:nvSpPr>
         <p:spPr>
           <a:xfrm>
-            <a:off x="1876006" y="3087915"/>
+            <a:off x="2748055" y="2596848"/>
             <a:ext cx="6400800" cy="1752600"/>
           </a:xfrm>
         </p:spPr>
@@ -3780,8 +3780,8 @@
         </p:nvSpPr>
         <p:spPr>
           <a:xfrm>
-            <a:off x="819265" y="-345453"/>
-            <a:ext cx="7953655" cy="6280628"/>
+            <a:off x="1691314" y="-836520"/>
+            <a:ext cx="8346880" cy="6280628"/>
           </a:xfrm>
           <a:prstGeom prst="roundRect">
             <a:avLst>
@@ -3847,7 +3847,7 @@
         </p:nvSpPr>
         <p:spPr>
           <a:xfrm>
-            <a:off x="968453" y="-25739"/>
+            <a:off x="1840502" y="-516806"/>
             <a:ext cx="1455629" cy="346760"/>
           </a:xfrm>
           <a:prstGeom prst="rect">
@@ -3912,7 +3912,7 @@
         </p:nvCxnSpPr>
         <p:spPr>
           <a:xfrm>
-            <a:off x="1696265" y="337934"/>
+            <a:off x="2568314" y="-153133"/>
             <a:ext cx="0" cy="2597583"/>
           </a:xfrm>
           <a:prstGeom prst="line">
@@ -3955,7 +3955,7 @@
         </p:nvSpPr>
         <p:spPr>
           <a:xfrm>
-            <a:off x="1624258" y="765052"/>
+            <a:off x="2496307" y="273985"/>
             <a:ext cx="164242" cy="7066437"/>
           </a:xfrm>
           <a:prstGeom prst="rect">
@@ -4008,7 +4008,7 @@
         </p:nvSpPr>
         <p:spPr>
           <a:xfrm>
-            <a:off x="2683892" y="-48834"/>
+            <a:off x="3555941" y="-539901"/>
             <a:ext cx="1529629" cy="467684"/>
           </a:xfrm>
           <a:prstGeom prst="rect">
@@ -4084,7 +4084,7 @@
         </p:nvCxnSpPr>
         <p:spPr>
           <a:xfrm flipH="1">
-            <a:off x="3473105" y="341619"/>
+            <a:off x="4345154" y="-149448"/>
             <a:ext cx="6902" cy="3929146"/>
           </a:xfrm>
           <a:prstGeom prst="line">
@@ -4127,7 +4127,7 @@
         </p:nvSpPr>
         <p:spPr>
           <a:xfrm>
-            <a:off x="3379207" y="856929"/>
+            <a:off x="4251256" y="365862"/>
             <a:ext cx="187795" cy="3413836"/>
           </a:xfrm>
           <a:prstGeom prst="rect">
@@ -4182,7 +4182,7 @@
         </p:nvCxnSpPr>
         <p:spPr>
           <a:xfrm>
-            <a:off x="-145108" y="765052"/>
+            <a:off x="726941" y="273985"/>
             <a:ext cx="1769365" cy="3769"/>
           </a:xfrm>
           <a:prstGeom prst="straightConnector1">
@@ -4226,7 +4226,7 @@
         </p:nvCxnSpPr>
         <p:spPr>
           <a:xfrm flipV="1">
-            <a:off x="1746560" y="865795"/>
+            <a:off x="2618609" y="374728"/>
             <a:ext cx="1626091" cy="10370"/>
           </a:xfrm>
           <a:prstGeom prst="straightConnector1">
@@ -4268,7 +4268,7 @@
         </p:nvSpPr>
         <p:spPr>
           <a:xfrm>
-            <a:off x="3025855" y="4497643"/>
+            <a:off x="3897904" y="4006576"/>
             <a:ext cx="855809" cy="215444"/>
           </a:xfrm>
           <a:prstGeom prst="rect">
@@ -4314,7 +4314,7 @@
         </p:nvCxnSpPr>
         <p:spPr>
           <a:xfrm flipV="1">
-            <a:off x="1776137" y="4262007"/>
+            <a:off x="2648186" y="3770940"/>
             <a:ext cx="1596514" cy="5378"/>
           </a:xfrm>
           <a:prstGeom prst="straightConnector1">
@@ -4358,7 +4358,7 @@
         </p:nvCxnSpPr>
         <p:spPr>
           <a:xfrm>
-            <a:off x="428206" y="7831489"/>
+            <a:off x="1300255" y="7340422"/>
             <a:ext cx="1196051" cy="0"/>
           </a:xfrm>
           <a:prstGeom prst="straightConnector1">
@@ -4404,7 +4404,7 @@
         </p:nvCxnSpPr>
         <p:spPr>
           <a:xfrm>
-            <a:off x="1776658" y="4703398"/>
+            <a:off x="2648707" y="4212331"/>
             <a:ext cx="6053239" cy="0"/>
           </a:xfrm>
           <a:prstGeom prst="straightConnector1">
@@ -4449,7 +4449,7 @@
         </p:nvCxnSpPr>
         <p:spPr>
           <a:xfrm>
-            <a:off x="1805502" y="7581898"/>
+            <a:off x="2677551" y="7090831"/>
             <a:ext cx="6118293" cy="4318"/>
           </a:xfrm>
           <a:prstGeom prst="straightConnector1">
@@ -4493,7 +4493,7 @@
         </p:nvSpPr>
         <p:spPr>
           <a:xfrm>
-            <a:off x="4080612" y="1183229"/>
+            <a:off x="4952661" y="692162"/>
             <a:ext cx="1357294" cy="184666"/>
           </a:xfrm>
           <a:prstGeom prst="rect">
@@ -4539,7 +4539,7 @@
         </p:nvSpPr>
         <p:spPr>
           <a:xfrm>
-            <a:off x="1571470" y="495938"/>
+            <a:off x="2443519" y="4871"/>
             <a:ext cx="1391716" cy="323165"/>
           </a:xfrm>
           <a:prstGeom prst="rect">
@@ -4599,7 +4599,7 @@
         </p:nvSpPr>
         <p:spPr>
           <a:xfrm>
-            <a:off x="4455190" y="7358636"/>
+            <a:off x="5327239" y="6867569"/>
             <a:ext cx="621216" cy="215444"/>
           </a:xfrm>
           <a:prstGeom prst="rect">
@@ -4645,7 +4645,7 @@
         </p:nvSpPr>
         <p:spPr>
           <a:xfrm>
-            <a:off x="723389" y="7483403"/>
+            <a:off x="1595438" y="6992336"/>
             <a:ext cx="762000" cy="215444"/>
           </a:xfrm>
           <a:prstGeom prst="rect">
@@ -4691,7 +4691,7 @@
         </p:nvSpPr>
         <p:spPr>
           <a:xfrm>
-            <a:off x="9411320" y="7278387"/>
+            <a:off x="10283369" y="6787320"/>
             <a:ext cx="152597" cy="243110"/>
           </a:xfrm>
           <a:prstGeom prst="rect">
@@ -4746,7 +4746,7 @@
         </p:nvCxnSpPr>
         <p:spPr>
           <a:xfrm>
-            <a:off x="8037636" y="7514385"/>
+            <a:off x="8909685" y="7023318"/>
             <a:ext cx="1373685" cy="0"/>
           </a:xfrm>
           <a:prstGeom prst="straightConnector1">
@@ -4790,7 +4790,7 @@
         </p:nvSpPr>
         <p:spPr>
           <a:xfrm>
-            <a:off x="5197970" y="572736"/>
+            <a:off x="6070019" y="81669"/>
             <a:ext cx="1891458" cy="432035"/>
           </a:xfrm>
           <a:prstGeom prst="rect">
@@ -4865,7 +4865,7 @@
         </p:nvCxnSpPr>
         <p:spPr>
           <a:xfrm>
-            <a:off x="3573558" y="1559416"/>
+            <a:off x="4445607" y="1068349"/>
             <a:ext cx="2476866" cy="0"/>
           </a:xfrm>
           <a:prstGeom prst="straightConnector1">
@@ -4905,7 +4905,7 @@
         </p:nvSpPr>
         <p:spPr>
           <a:xfrm>
-            <a:off x="6063632" y="1016321"/>
+            <a:off x="6935681" y="525254"/>
             <a:ext cx="205843" cy="123165"/>
           </a:xfrm>
           <a:prstGeom prst="rect">
@@ -4961,7 +4961,7 @@
         </p:nvCxnSpPr>
         <p:spPr>
           <a:xfrm>
-            <a:off x="6166554" y="1016321"/>
+            <a:off x="7038603" y="525254"/>
             <a:ext cx="22737" cy="3304034"/>
           </a:xfrm>
           <a:prstGeom prst="line">
@@ -5004,8 +5004,8 @@
         </p:nvSpPr>
         <p:spPr>
           <a:xfrm>
-            <a:off x="6062847" y="1539733"/>
-            <a:ext cx="205842" cy="1873441"/>
+            <a:off x="6922473" y="1048666"/>
+            <a:ext cx="218265" cy="2527779"/>
           </a:xfrm>
           <a:prstGeom prst="rect">
             <a:avLst/>
@@ -5059,7 +5059,7 @@
         </p:nvCxnSpPr>
         <p:spPr>
           <a:xfrm>
-            <a:off x="8012483" y="6549979"/>
+            <a:off x="8884532" y="6058912"/>
             <a:ext cx="644251" cy="0"/>
           </a:xfrm>
           <a:prstGeom prst="straightConnector1">
@@ -5101,7 +5101,7 @@
         </p:nvCxnSpPr>
         <p:spPr>
           <a:xfrm>
-            <a:off x="3567002" y="934360"/>
+            <a:off x="4439051" y="443293"/>
             <a:ext cx="1630968" cy="281"/>
           </a:xfrm>
           <a:prstGeom prst="straightConnector1">
@@ -5145,7 +5145,7 @@
         </p:nvCxnSpPr>
         <p:spPr>
           <a:xfrm>
-            <a:off x="3582925" y="1139486"/>
+            <a:off x="4454974" y="648419"/>
             <a:ext cx="2479922" cy="0"/>
           </a:xfrm>
           <a:prstGeom prst="straightConnector1">
@@ -5189,7 +5189,7 @@
         </p:nvSpPr>
         <p:spPr>
           <a:xfrm>
-            <a:off x="6058872" y="4211515"/>
+            <a:off x="6930921" y="3720448"/>
             <a:ext cx="258404" cy="261610"/>
           </a:xfrm>
           <a:prstGeom prst="rect">
@@ -5228,7 +5228,7 @@
         </p:nvSpPr>
         <p:spPr>
           <a:xfrm>
-            <a:off x="7311397" y="1779769"/>
+            <a:off x="8167432" y="2640068"/>
             <a:ext cx="1173661" cy="529849"/>
           </a:xfrm>
           <a:prstGeom prst="rect">
@@ -5295,7 +5295,7 @@
         </p:nvCxnSpPr>
         <p:spPr>
           <a:xfrm flipV="1">
-            <a:off x="6281112" y="2575603"/>
+            <a:off x="7137147" y="3435902"/>
             <a:ext cx="1525528" cy="6885"/>
           </a:xfrm>
           <a:prstGeom prst="straightConnector1">
@@ -5341,7 +5341,7 @@
         </p:nvCxnSpPr>
         <p:spPr>
           <a:xfrm>
-            <a:off x="3582925" y="3427188"/>
+            <a:off x="4454974" y="3559577"/>
             <a:ext cx="2510991" cy="0"/>
           </a:xfrm>
           <a:prstGeom prst="straightConnector1">
@@ -5385,7 +5385,7 @@
         </p:nvSpPr>
         <p:spPr>
           <a:xfrm>
-            <a:off x="-1382463" y="530618"/>
+            <a:off x="-510414" y="39551"/>
             <a:ext cx="2818918" cy="184666"/>
           </a:xfrm>
           <a:prstGeom prst="rect">
@@ -5425,7 +5425,7 @@
         </p:nvSpPr>
         <p:spPr>
           <a:xfrm>
-            <a:off x="8656734" y="6528891"/>
+            <a:off x="9528783" y="6037824"/>
             <a:ext cx="1644229" cy="759484"/>
           </a:xfrm>
           <a:prstGeom prst="rect">
@@ -5498,7 +5498,7 @@
         </p:nvSpPr>
         <p:spPr>
           <a:xfrm>
-            <a:off x="7966704" y="7298941"/>
+            <a:off x="8838753" y="6807874"/>
             <a:ext cx="621216" cy="215444"/>
           </a:xfrm>
           <a:prstGeom prst="rect">
@@ -5544,7 +5544,7 @@
         </p:nvSpPr>
         <p:spPr>
           <a:xfrm>
-            <a:off x="3514478" y="694953"/>
+            <a:off x="4386527" y="203886"/>
             <a:ext cx="1708581" cy="169277"/>
           </a:xfrm>
           <a:prstGeom prst="rect">
@@ -5595,7 +5595,7 @@
         </p:nvSpPr>
         <p:spPr>
           <a:xfrm>
-            <a:off x="7806640" y="2309618"/>
+            <a:off x="8662675" y="3169917"/>
             <a:ext cx="205843" cy="265984"/>
           </a:xfrm>
           <a:prstGeom prst="rect">
@@ -5651,7 +5651,7 @@
         </p:nvCxnSpPr>
         <p:spPr>
           <a:xfrm>
-            <a:off x="7909562" y="2309618"/>
+            <a:off x="8765597" y="3169917"/>
             <a:ext cx="0" cy="4935123"/>
           </a:xfrm>
           <a:prstGeom prst="line">
@@ -5696,7 +5696,7 @@
         </p:nvCxnSpPr>
         <p:spPr>
           <a:xfrm>
-            <a:off x="6268689" y="2309618"/>
+            <a:off x="7140738" y="3176297"/>
             <a:ext cx="1031063" cy="0"/>
           </a:xfrm>
           <a:prstGeom prst="straightConnector1">
@@ -5736,7 +5736,7 @@
         </p:nvSpPr>
         <p:spPr>
           <a:xfrm>
-            <a:off x="2034916" y="4037861"/>
+            <a:off x="2906965" y="3546794"/>
             <a:ext cx="621216" cy="215444"/>
           </a:xfrm>
           <a:prstGeom prst="rect">
@@ -5782,7 +5782,7 @@
         </p:nvSpPr>
         <p:spPr>
           <a:xfrm>
-            <a:off x="4313142" y="3182350"/>
+            <a:off x="5185191" y="3314739"/>
             <a:ext cx="621216" cy="215444"/>
           </a:xfrm>
           <a:prstGeom prst="rect">
@@ -5828,7 +5828,7 @@
         </p:nvSpPr>
         <p:spPr>
           <a:xfrm>
-            <a:off x="7829897" y="4693709"/>
+            <a:off x="8701946" y="4202642"/>
             <a:ext cx="187795" cy="2892507"/>
           </a:xfrm>
           <a:prstGeom prst="rect">
@@ -5864,6 +5864,728 @@
           <a:p>
             <a:pPr algn="ctr"/>
             <a:endParaRPr lang="en-SG" sz="1400" dirty="0"/>
+          </a:p>
+        </p:txBody>
+      </p:sp>
+      <p:cxnSp>
+        <p:nvCxnSpPr>
+          <p:cNvPr id="49" name="Straight Arrow Connector 62">
+            <a:extLst>
+              <a:ext uri="{FF2B5EF4-FFF2-40B4-BE49-F238E27FC236}">
+                <a16:creationId xmlns:a16="http://schemas.microsoft.com/office/drawing/2014/main" id="{4109F4A9-7C5C-4775-8D64-2521578DA8B4}"/>
+              </a:ext>
+            </a:extLst>
+          </p:cNvPr>
+          <p:cNvCxnSpPr>
+            <a:cxnSpLocks/>
+          </p:cNvCxnSpPr>
+          <p:nvPr/>
+        </p:nvCxnSpPr>
+        <p:spPr>
+          <a:xfrm flipV="1">
+            <a:off x="7148792" y="2090895"/>
+            <a:ext cx="1525528" cy="6885"/>
+          </a:xfrm>
+          <a:prstGeom prst="straightConnector1">
+            <a:avLst/>
+          </a:prstGeom>
+          <a:ln w="19050">
+            <a:solidFill>
+              <a:srgbClr val="0070C0"/>
+            </a:solidFill>
+            <a:prstDash val="sysDash"/>
+            <a:headEnd type="arrow" w="med" len="med"/>
+            <a:tailEnd type="none" w="med" len="med"/>
+          </a:ln>
+        </p:spPr>
+        <p:style>
+          <a:lnRef idx="1">
+            <a:schemeClr val="accent1"/>
+          </a:lnRef>
+          <a:fillRef idx="0">
+            <a:schemeClr val="accent1"/>
+          </a:fillRef>
+          <a:effectRef idx="0">
+            <a:schemeClr val="accent1"/>
+          </a:effectRef>
+          <a:fontRef idx="minor">
+            <a:schemeClr val="tx1"/>
+          </a:fontRef>
+        </p:style>
+      </p:cxnSp>
+      <p:sp>
+        <p:nvSpPr>
+          <p:cNvPr id="50" name="Rectangle 44">
+            <a:extLst>
+              <a:ext uri="{FF2B5EF4-FFF2-40B4-BE49-F238E27FC236}">
+                <a16:creationId xmlns:a16="http://schemas.microsoft.com/office/drawing/2014/main" id="{FB5544A0-9710-42F4-BDE3-E29FB6D84CE0}"/>
+              </a:ext>
+            </a:extLst>
+          </p:cNvPr>
+          <p:cNvSpPr/>
+          <p:nvPr/>
+        </p:nvSpPr>
+        <p:spPr>
+          <a:xfrm>
+            <a:off x="8674320" y="1824910"/>
+            <a:ext cx="205843" cy="265984"/>
+          </a:xfrm>
+          <a:prstGeom prst="rect">
+            <a:avLst/>
+          </a:prstGeom>
+          <a:solidFill>
+            <a:srgbClr val="0070C0"/>
+          </a:solidFill>
+          <a:ln>
+            <a:solidFill>
+              <a:srgbClr val="0070C0"/>
+            </a:solidFill>
+          </a:ln>
+          <a:effectLst/>
+        </p:spPr>
+        <p:style>
+          <a:lnRef idx="1">
+            <a:schemeClr val="accent3"/>
+          </a:lnRef>
+          <a:fillRef idx="2">
+            <a:schemeClr val="accent3"/>
+          </a:fillRef>
+          <a:effectRef idx="1">
+            <a:schemeClr val="accent3"/>
+          </a:effectRef>
+          <a:fontRef idx="minor">
+            <a:schemeClr val="dk1"/>
+          </a:fontRef>
+        </p:style>
+        <p:txBody>
+          <a:bodyPr rtlCol="0" anchor="ctr"/>
+          <a:lstStyle/>
+          <a:p>
+            <a:pPr algn="ctr"/>
+            <a:endParaRPr lang="en-SG" sz="1400" dirty="0"/>
+          </a:p>
+        </p:txBody>
+      </p:sp>
+      <p:cxnSp>
+        <p:nvCxnSpPr>
+          <p:cNvPr id="51" name="Straight Arrow Connector 7">
+            <a:extLst>
+              <a:ext uri="{FF2B5EF4-FFF2-40B4-BE49-F238E27FC236}">
+                <a16:creationId xmlns:a16="http://schemas.microsoft.com/office/drawing/2014/main" id="{E659EED0-B22D-48E1-8B84-2B33EEE9D26A}"/>
+              </a:ext>
+            </a:extLst>
+          </p:cNvPr>
+          <p:cNvCxnSpPr>
+            <a:cxnSpLocks/>
+          </p:cNvCxnSpPr>
+          <p:nvPr/>
+        </p:nvCxnSpPr>
+        <p:spPr>
+          <a:xfrm>
+            <a:off x="7136369" y="1824910"/>
+            <a:ext cx="1031063" cy="0"/>
+          </a:xfrm>
+          <a:prstGeom prst="straightConnector1">
+            <a:avLst/>
+          </a:prstGeom>
+          <a:ln w="19050">
+            <a:headEnd type="none" w="med" len="med"/>
+            <a:tailEnd type="arrow" w="med" len="med"/>
+          </a:ln>
+        </p:spPr>
+        <p:style>
+          <a:lnRef idx="1">
+            <a:schemeClr val="accent1"/>
+          </a:lnRef>
+          <a:fillRef idx="0">
+            <a:schemeClr val="accent1"/>
+          </a:fillRef>
+          <a:effectRef idx="0">
+            <a:schemeClr val="accent1"/>
+          </a:effectRef>
+          <a:fontRef idx="minor">
+            <a:schemeClr val="tx1"/>
+          </a:fontRef>
+        </p:style>
+      </p:cxnSp>
+      <p:cxnSp>
+        <p:nvCxnSpPr>
+          <p:cNvPr id="52" name="Straight Connector 45">
+            <a:extLst>
+              <a:ext uri="{FF2B5EF4-FFF2-40B4-BE49-F238E27FC236}">
+                <a16:creationId xmlns:a16="http://schemas.microsoft.com/office/drawing/2014/main" id="{B2AB5B3E-6571-4926-BA85-F053A286020D}"/>
+              </a:ext>
+            </a:extLst>
+          </p:cNvPr>
+          <p:cNvCxnSpPr>
+            <a:cxnSpLocks/>
+            <a:stCxn id="50" idx="0"/>
+          </p:cNvCxnSpPr>
+          <p:nvPr/>
+        </p:nvCxnSpPr>
+        <p:spPr>
+          <a:xfrm>
+            <a:off x="8777242" y="1824910"/>
+            <a:ext cx="0" cy="481418"/>
+          </a:xfrm>
+          <a:prstGeom prst="line">
+            <a:avLst/>
+          </a:prstGeom>
+          <a:ln w="19050">
+            <a:solidFill>
+              <a:srgbClr val="0070C0"/>
+            </a:solidFill>
+            <a:prstDash val="sysDash"/>
+          </a:ln>
+          <a:effectLst/>
+        </p:spPr>
+        <p:style>
+          <a:lnRef idx="1">
+            <a:schemeClr val="accent1"/>
+          </a:lnRef>
+          <a:fillRef idx="2">
+            <a:schemeClr val="accent1"/>
+          </a:fillRef>
+          <a:effectRef idx="1">
+            <a:schemeClr val="accent1"/>
+          </a:effectRef>
+          <a:fontRef idx="minor">
+            <a:schemeClr val="dk1"/>
+          </a:fontRef>
+        </p:style>
+      </p:cxnSp>
+      <p:sp>
+        <p:nvSpPr>
+          <p:cNvPr id="46" name="Rectangle 62">
+            <a:extLst>
+              <a:ext uri="{FF2B5EF4-FFF2-40B4-BE49-F238E27FC236}">
+                <a16:creationId xmlns:a16="http://schemas.microsoft.com/office/drawing/2014/main" id="{A048B51B-B70C-48FA-93EC-365CB4C3343E}"/>
+              </a:ext>
+            </a:extLst>
+          </p:cNvPr>
+          <p:cNvSpPr/>
+          <p:nvPr/>
+        </p:nvSpPr>
+        <p:spPr>
+          <a:xfrm>
+            <a:off x="8179077" y="1295061"/>
+            <a:ext cx="1173661" cy="529849"/>
+          </a:xfrm>
+          <a:prstGeom prst="rect">
+            <a:avLst/>
+          </a:prstGeom>
+          <a:solidFill>
+            <a:srgbClr val="0070C0"/>
+          </a:solidFill>
+          <a:ln w="19050">
+            <a:solidFill>
+              <a:srgbClr val="0070C0"/>
+            </a:solidFill>
+          </a:ln>
+          <a:effectLst/>
+        </p:spPr>
+        <p:style>
+          <a:lnRef idx="1">
+            <a:schemeClr val="accent2"/>
+          </a:lnRef>
+          <a:fillRef idx="2">
+            <a:schemeClr val="accent2"/>
+          </a:fillRef>
+          <a:effectRef idx="1">
+            <a:schemeClr val="accent2"/>
+          </a:effectRef>
+          <a:fontRef idx="minor">
+            <a:schemeClr val="dk1"/>
+          </a:fontRef>
+        </p:style>
+        <p:txBody>
+          <a:bodyPr rtlCol="0" anchor="ctr"/>
+          <a:lstStyle/>
+          <a:p>
+            <a:pPr algn="ctr"/>
+            <a:r>
+              <a:rPr lang="en-US" sz="1600" dirty="0">
+                <a:solidFill>
+                  <a:schemeClr val="bg1"/>
+                </a:solidFill>
+              </a:rPr>
+              <a:t>s:SummaryCommand</a:t>
+            </a:r>
+            <a:endParaRPr lang="en-SG" sz="1600" dirty="0">
+              <a:solidFill>
+                <a:schemeClr val="bg1"/>
+              </a:solidFill>
+            </a:endParaRPr>
+          </a:p>
+        </p:txBody>
+      </p:sp>
+      <p:cxnSp>
+        <p:nvCxnSpPr>
+          <p:cNvPr id="54" name="Straight Arrow Connector 65">
+            <a:extLst>
+              <a:ext uri="{FF2B5EF4-FFF2-40B4-BE49-F238E27FC236}">
+                <a16:creationId xmlns:a16="http://schemas.microsoft.com/office/drawing/2014/main" id="{92B276E9-8FDC-4221-B36B-601E5540207E}"/>
+              </a:ext>
+            </a:extLst>
+          </p:cNvPr>
+          <p:cNvCxnSpPr>
+            <a:cxnSpLocks/>
+          </p:cNvCxnSpPr>
+          <p:nvPr/>
+        </p:nvCxnSpPr>
+        <p:spPr>
+          <a:xfrm>
+            <a:off x="4454976" y="2194905"/>
+            <a:ext cx="2510991" cy="0"/>
+          </a:xfrm>
+          <a:prstGeom prst="straightConnector1">
+            <a:avLst/>
+          </a:prstGeom>
+          <a:ln w="19050">
+            <a:solidFill>
+              <a:srgbClr val="0070C0"/>
+            </a:solidFill>
+            <a:prstDash val="sysDash"/>
+            <a:headEnd type="arrow" w="med" len="med"/>
+            <a:tailEnd type="none" w="med" len="med"/>
+          </a:ln>
+        </p:spPr>
+        <p:style>
+          <a:lnRef idx="1">
+            <a:schemeClr val="accent1"/>
+          </a:lnRef>
+          <a:fillRef idx="0">
+            <a:schemeClr val="accent1"/>
+          </a:fillRef>
+          <a:effectRef idx="0">
+            <a:schemeClr val="accent1"/>
+          </a:effectRef>
+          <a:fontRef idx="minor">
+            <a:schemeClr val="tx1"/>
+          </a:fontRef>
+        </p:style>
+      </p:cxnSp>
+      <p:sp>
+        <p:nvSpPr>
+          <p:cNvPr id="55" name="TextBox 81">
+            <a:extLst>
+              <a:ext uri="{FF2B5EF4-FFF2-40B4-BE49-F238E27FC236}">
+                <a16:creationId xmlns:a16="http://schemas.microsoft.com/office/drawing/2014/main" id="{0CD818AA-3F18-41A4-8991-288AA0ADEBB2}"/>
+              </a:ext>
+            </a:extLst>
+          </p:cNvPr>
+          <p:cNvSpPr txBox="1"/>
+          <p:nvPr/>
+        </p:nvSpPr>
+        <p:spPr>
+          <a:xfrm>
+            <a:off x="5185193" y="1950067"/>
+            <a:ext cx="621216" cy="215444"/>
+          </a:xfrm>
+          <a:prstGeom prst="rect">
+            <a:avLst/>
+          </a:prstGeom>
+          <a:noFill/>
+        </p:spPr>
+        <p:txBody>
+          <a:bodyPr wrap="square" lIns="0" tIns="0" rIns="0" bIns="0" rtlCol="0">
+            <a:spAutoFit/>
+          </a:bodyPr>
+          <a:lstStyle>
+            <a:defPPr>
+              <a:defRPr lang="en-US"/>
+            </a:defPPr>
+            <a:lvl1pPr algn="r">
+              <a:defRPr sz="1400">
+                <a:solidFill>
+                  <a:srgbClr val="0070C0"/>
+                </a:solidFill>
+              </a:defRPr>
+            </a:lvl1pPr>
+          </a:lstStyle>
+          <a:p>
+            <a:r>
+              <a:rPr lang="en-US" dirty="0"/>
+              <a:t>s</a:t>
+            </a:r>
+          </a:p>
+        </p:txBody>
+      </p:sp>
+      <p:sp>
+        <p:nvSpPr>
+          <p:cNvPr id="3" name="Rectangle: Single Corner Snipped 2">
+            <a:extLst>
+              <a:ext uri="{FF2B5EF4-FFF2-40B4-BE49-F238E27FC236}">
+                <a16:creationId xmlns:a16="http://schemas.microsoft.com/office/drawing/2014/main" id="{1DCD24D9-2D61-4A19-BE1D-34BF9FAAF5C6}"/>
+              </a:ext>
+            </a:extLst>
+          </p:cNvPr>
+          <p:cNvSpPr/>
+          <p:nvPr/>
+        </p:nvSpPr>
+        <p:spPr>
+          <a:xfrm flipV="1">
+            <a:off x="6036661" y="1197512"/>
+            <a:ext cx="600220" cy="356504"/>
+          </a:xfrm>
+          <a:prstGeom prst="snip1Rect">
+            <a:avLst>
+              <a:gd name="adj" fmla="val 43871"/>
+            </a:avLst>
+          </a:prstGeom>
+          <a:noFill/>
+          <a:ln w="28575">
+            <a:solidFill>
+              <a:srgbClr val="FF0000"/>
+            </a:solidFill>
+          </a:ln>
+        </p:spPr>
+        <p:style>
+          <a:lnRef idx="2">
+            <a:schemeClr val="accent1">
+              <a:shade val="50000"/>
+            </a:schemeClr>
+          </a:lnRef>
+          <a:fillRef idx="1">
+            <a:schemeClr val="accent1"/>
+          </a:fillRef>
+          <a:effectRef idx="0">
+            <a:schemeClr val="accent1"/>
+          </a:effectRef>
+          <a:fontRef idx="minor">
+            <a:schemeClr val="lt1"/>
+          </a:fontRef>
+        </p:style>
+        <p:txBody>
+          <a:bodyPr rtlCol="0" anchor="ctr"/>
+          <a:lstStyle/>
+          <a:p>
+            <a:pPr algn="ctr"/>
+            <a:endParaRPr lang="en-SG">
+              <a:solidFill>
+                <a:schemeClr val="tx1"/>
+              </a:solidFill>
+            </a:endParaRPr>
+          </a:p>
+        </p:txBody>
+      </p:sp>
+      <p:sp>
+        <p:nvSpPr>
+          <p:cNvPr id="5" name="Rectangle 4">
+            <a:extLst>
+              <a:ext uri="{FF2B5EF4-FFF2-40B4-BE49-F238E27FC236}">
+                <a16:creationId xmlns:a16="http://schemas.microsoft.com/office/drawing/2014/main" id="{7E4ECC1C-B39F-4417-94C5-2823D153D8F3}"/>
+              </a:ext>
+            </a:extLst>
+          </p:cNvPr>
+          <p:cNvSpPr/>
+          <p:nvPr/>
+        </p:nvSpPr>
+        <p:spPr>
+          <a:xfrm>
+            <a:off x="6036662" y="1190892"/>
+            <a:ext cx="3423308" cy="2446696"/>
+          </a:xfrm>
+          <a:prstGeom prst="rect">
+            <a:avLst/>
+          </a:prstGeom>
+          <a:noFill/>
+          <a:ln w="28575">
+            <a:solidFill>
+              <a:srgbClr val="FF0000"/>
+            </a:solidFill>
+          </a:ln>
+        </p:spPr>
+        <p:style>
+          <a:lnRef idx="2">
+            <a:schemeClr val="accent1">
+              <a:shade val="50000"/>
+            </a:schemeClr>
+          </a:lnRef>
+          <a:fillRef idx="1">
+            <a:schemeClr val="accent1"/>
+          </a:fillRef>
+          <a:effectRef idx="0">
+            <a:schemeClr val="accent1"/>
+          </a:effectRef>
+          <a:fontRef idx="minor">
+            <a:schemeClr val="lt1"/>
+          </a:fontRef>
+        </p:style>
+        <p:txBody>
+          <a:bodyPr rtlCol="0" anchor="ctr"/>
+          <a:lstStyle/>
+          <a:p>
+            <a:pPr algn="ctr"/>
+            <a:endParaRPr lang="en-SG"/>
+          </a:p>
+        </p:txBody>
+      </p:sp>
+      <p:sp>
+        <p:nvSpPr>
+          <p:cNvPr id="22" name="TextBox 21">
+            <a:extLst>
+              <a:ext uri="{FF2B5EF4-FFF2-40B4-BE49-F238E27FC236}">
+                <a16:creationId xmlns:a16="http://schemas.microsoft.com/office/drawing/2014/main" id="{7B2BCDE2-4B20-4720-8F8E-0B5B3A144D15}"/>
+              </a:ext>
+            </a:extLst>
+          </p:cNvPr>
+          <p:cNvSpPr txBox="1"/>
+          <p:nvPr/>
+        </p:nvSpPr>
+        <p:spPr>
+          <a:xfrm>
+            <a:off x="6061965" y="1218569"/>
+            <a:ext cx="483765" cy="338554"/>
+          </a:xfrm>
+          <a:prstGeom prst="rect">
+            <a:avLst/>
+          </a:prstGeom>
+          <a:noFill/>
+        </p:spPr>
+        <p:txBody>
+          <a:bodyPr wrap="square" rtlCol="0">
+            <a:spAutoFit/>
+          </a:bodyPr>
+          <a:lstStyle/>
+          <a:p>
+            <a:r>
+              <a:rPr lang="en-SG" sz="1600" dirty="0"/>
+              <a:t>Alt</a:t>
+            </a:r>
+          </a:p>
+        </p:txBody>
+      </p:sp>
+      <p:sp>
+        <p:nvSpPr>
+          <p:cNvPr id="24" name="Rectangle 23">
+            <a:extLst>
+              <a:ext uri="{FF2B5EF4-FFF2-40B4-BE49-F238E27FC236}">
+                <a16:creationId xmlns:a16="http://schemas.microsoft.com/office/drawing/2014/main" id="{9934F5E8-DEAE-4432-88CD-30B7158CC461}"/>
+              </a:ext>
+            </a:extLst>
+          </p:cNvPr>
+          <p:cNvSpPr/>
+          <p:nvPr/>
+        </p:nvSpPr>
+        <p:spPr>
+          <a:xfrm>
+            <a:off x="7072985" y="1249418"/>
+            <a:ext cx="1162178" cy="276999"/>
+          </a:xfrm>
+          <a:prstGeom prst="rect">
+            <a:avLst/>
+          </a:prstGeom>
+        </p:spPr>
+        <p:txBody>
+          <a:bodyPr wrap="none">
+            <a:spAutoFit/>
+          </a:bodyPr>
+          <a:lstStyle/>
+          <a:p>
+            <a:r>
+              <a:rPr lang="en-SG" sz="1200" dirty="0">
+                <a:solidFill>
+                  <a:srgbClr val="FF0000"/>
+                </a:solidFill>
+              </a:rPr>
+              <a:t>[No arguments]</a:t>
+            </a:r>
+          </a:p>
+        </p:txBody>
+      </p:sp>
+      <p:cxnSp>
+        <p:nvCxnSpPr>
+          <p:cNvPr id="31" name="Straight Connector 30">
+            <a:extLst>
+              <a:ext uri="{FF2B5EF4-FFF2-40B4-BE49-F238E27FC236}">
+                <a16:creationId xmlns:a16="http://schemas.microsoft.com/office/drawing/2014/main" id="{0CA6FB36-692F-4726-97F4-BEB5B2B8B640}"/>
+              </a:ext>
+            </a:extLst>
+          </p:cNvPr>
+          <p:cNvCxnSpPr>
+            <a:stCxn id="5" idx="1"/>
+            <a:endCxn id="5" idx="3"/>
+          </p:cNvCxnSpPr>
+          <p:nvPr/>
+        </p:nvCxnSpPr>
+        <p:spPr>
+          <a:xfrm>
+            <a:off x="6036662" y="2414240"/>
+            <a:ext cx="3423308" cy="0"/>
+          </a:xfrm>
+          <a:prstGeom prst="line">
+            <a:avLst/>
+          </a:prstGeom>
+          <a:ln w="28575">
+            <a:solidFill>
+              <a:srgbClr val="FF0000"/>
+            </a:solidFill>
+          </a:ln>
+        </p:spPr>
+        <p:style>
+          <a:lnRef idx="1">
+            <a:schemeClr val="accent1"/>
+          </a:lnRef>
+          <a:fillRef idx="0">
+            <a:schemeClr val="accent1"/>
+          </a:fillRef>
+          <a:effectRef idx="0">
+            <a:schemeClr val="accent1"/>
+          </a:effectRef>
+          <a:fontRef idx="minor">
+            <a:schemeClr val="tx1"/>
+          </a:fontRef>
+        </p:style>
+      </p:cxnSp>
+      <p:sp>
+        <p:nvSpPr>
+          <p:cNvPr id="43" name="Rectangle 42">
+            <a:extLst>
+              <a:ext uri="{FF2B5EF4-FFF2-40B4-BE49-F238E27FC236}">
+                <a16:creationId xmlns:a16="http://schemas.microsoft.com/office/drawing/2014/main" id="{85433533-6116-408B-B850-83EE49C154CA}"/>
+              </a:ext>
+            </a:extLst>
+          </p:cNvPr>
+          <p:cNvSpPr/>
+          <p:nvPr/>
+        </p:nvSpPr>
+        <p:spPr>
+          <a:xfrm>
+            <a:off x="7112734" y="2436491"/>
+            <a:ext cx="527709" cy="276999"/>
+          </a:xfrm>
+          <a:prstGeom prst="rect">
+            <a:avLst/>
+          </a:prstGeom>
+        </p:spPr>
+        <p:txBody>
+          <a:bodyPr wrap="none">
+            <a:spAutoFit/>
+          </a:bodyPr>
+          <a:lstStyle/>
+          <a:p>
+            <a:r>
+              <a:rPr lang="en-SG" sz="1200" dirty="0">
+                <a:solidFill>
+                  <a:srgbClr val="FF0000"/>
+                </a:solidFill>
+              </a:rPr>
+              <a:t>[else]</a:t>
+            </a:r>
+          </a:p>
+        </p:txBody>
+      </p:sp>
+      <p:sp>
+        <p:nvSpPr>
+          <p:cNvPr id="64" name="TextBox 79">
+            <a:extLst>
+              <a:ext uri="{FF2B5EF4-FFF2-40B4-BE49-F238E27FC236}">
+                <a16:creationId xmlns:a16="http://schemas.microsoft.com/office/drawing/2014/main" id="{09ABCA5F-6387-4186-B006-2FD1D41DCD0C}"/>
+              </a:ext>
+            </a:extLst>
+          </p:cNvPr>
+          <p:cNvSpPr txBox="1"/>
+          <p:nvPr/>
+        </p:nvSpPr>
+        <p:spPr>
+          <a:xfrm>
+            <a:off x="7148013" y="1616504"/>
+            <a:ext cx="1031064" cy="138499"/>
+          </a:xfrm>
+          <a:prstGeom prst="rect">
+            <a:avLst/>
+          </a:prstGeom>
+          <a:noFill/>
+        </p:spPr>
+        <p:txBody>
+          <a:bodyPr wrap="square" lIns="0" tIns="0" rIns="0" bIns="0" rtlCol="0">
+            <a:spAutoFit/>
+          </a:bodyPr>
+          <a:lstStyle>
+            <a:defPPr>
+              <a:defRPr lang="en-US"/>
+            </a:defPPr>
+            <a:lvl1pPr algn="r">
+              <a:defRPr sz="1400">
+                <a:solidFill>
+                  <a:srgbClr val="0070C0"/>
+                </a:solidFill>
+              </a:defRPr>
+            </a:lvl1pPr>
+          </a:lstStyle>
+          <a:p>
+            <a:pPr algn="ctr"/>
+            <a:r>
+              <a:rPr lang="en-US" sz="900" dirty="0" err="1"/>
+              <a:t>SummaryCommand</a:t>
+            </a:r>
+            <a:r>
+              <a:rPr lang="en-US" sz="900" dirty="0"/>
+              <a:t>()</a:t>
+            </a:r>
+          </a:p>
+        </p:txBody>
+      </p:sp>
+      <p:sp>
+        <p:nvSpPr>
+          <p:cNvPr id="65" name="TextBox 79">
+            <a:extLst>
+              <a:ext uri="{FF2B5EF4-FFF2-40B4-BE49-F238E27FC236}">
+                <a16:creationId xmlns:a16="http://schemas.microsoft.com/office/drawing/2014/main" id="{77F02AC1-3808-479B-8389-776BA4BE86D2}"/>
+              </a:ext>
+            </a:extLst>
+          </p:cNvPr>
+          <p:cNvSpPr txBox="1"/>
+          <p:nvPr/>
+        </p:nvSpPr>
+        <p:spPr>
+          <a:xfrm>
+            <a:off x="7092615" y="2929523"/>
+            <a:ext cx="1031064" cy="215444"/>
+          </a:xfrm>
+          <a:prstGeom prst="rect">
+            <a:avLst/>
+          </a:prstGeom>
+          <a:noFill/>
+        </p:spPr>
+        <p:txBody>
+          <a:bodyPr wrap="square" lIns="0" tIns="0" rIns="0" bIns="0" rtlCol="0">
+            <a:spAutoFit/>
+          </a:bodyPr>
+          <a:lstStyle>
+            <a:defPPr>
+              <a:defRPr lang="en-US"/>
+            </a:defPPr>
+            <a:lvl1pPr algn="r">
+              <a:defRPr sz="1400">
+                <a:solidFill>
+                  <a:srgbClr val="0070C0"/>
+                </a:solidFill>
+              </a:defRPr>
+            </a:lvl1pPr>
+          </a:lstStyle>
+          <a:p>
+            <a:pPr algn="ctr"/>
+            <a:r>
+              <a:rPr lang="en-US" sz="700" dirty="0" err="1"/>
+              <a:t>SummaryCommand</a:t>
+            </a:r>
+            <a:br>
+              <a:rPr lang="en-US" sz="700" dirty="0"/>
+            </a:br>
+            <a:r>
+              <a:rPr lang="en-US" sz="700" dirty="0"/>
+              <a:t>(</a:t>
+            </a:r>
+            <a:r>
+              <a:rPr lang="en-US" sz="700" dirty="0" err="1"/>
+              <a:t>periodAmount</a:t>
+            </a:r>
+            <a:r>
+              <a:rPr lang="en-US" sz="700" dirty="0"/>
+              <a:t>, period)</a:t>
+            </a:r>
           </a:p>
         </p:txBody>
       </p:sp>

</xml_diff>

<commit_message>
Updated DG - Summary Feature
</commit_message>
<xml_diff>
--- a/docs/diagrams/SummarySequenceDiagram.pptx
+++ b/docs/diagrams/SummarySequenceDiagram.pptx
@@ -3692,8 +3692,8 @@
         </p:nvSpPr>
         <p:spPr>
           <a:xfrm>
-            <a:off x="465683" y="-1303867"/>
-            <a:ext cx="11260633" cy="9719733"/>
+            <a:off x="465684" y="-1315590"/>
+            <a:ext cx="12303260" cy="9719733"/>
           </a:xfrm>
           <a:prstGeom prst="roundRect">
             <a:avLst>
@@ -5646,13 +5646,14 @@
           <p:cNvCxnSpPr>
             <a:cxnSpLocks/>
             <a:stCxn id="85" idx="0"/>
+            <a:endCxn id="109" idx="2"/>
           </p:cNvCxnSpPr>
           <p:nvPr/>
         </p:nvCxnSpPr>
         <p:spPr>
           <a:xfrm>
             <a:off x="8765597" y="3169917"/>
-            <a:ext cx="0" cy="4935123"/>
+            <a:ext cx="30247" cy="3925232"/>
           </a:xfrm>
           <a:prstGeom prst="line">
             <a:avLst/>
@@ -6585,6 +6586,739 @@
             <a:r>
               <a:rPr lang="en-US" sz="700" dirty="0"/>
               <a:t>, period)</a:t>
+            </a:r>
+          </a:p>
+        </p:txBody>
+      </p:sp>
+      <p:sp>
+        <p:nvSpPr>
+          <p:cNvPr id="61" name="Rectangle 62">
+            <a:extLst>
+              <a:ext uri="{FF2B5EF4-FFF2-40B4-BE49-F238E27FC236}">
+                <a16:creationId xmlns:a16="http://schemas.microsoft.com/office/drawing/2014/main" id="{85E94824-58BE-4EEA-9D31-2F2EC766A2D8}"/>
+              </a:ext>
+            </a:extLst>
+          </p:cNvPr>
+          <p:cNvSpPr/>
+          <p:nvPr/>
+        </p:nvSpPr>
+        <p:spPr>
+          <a:xfrm>
+            <a:off x="10548113" y="-286068"/>
+            <a:ext cx="1455629" cy="346760"/>
+          </a:xfrm>
+          <a:prstGeom prst="rect">
+            <a:avLst/>
+          </a:prstGeom>
+          <a:solidFill>
+            <a:srgbClr val="7030A0"/>
+          </a:solidFill>
+          <a:ln w="19050">
+            <a:solidFill>
+              <a:srgbClr val="7030A0"/>
+            </a:solidFill>
+          </a:ln>
+          <a:effectLst/>
+        </p:spPr>
+        <p:style>
+          <a:lnRef idx="1">
+            <a:schemeClr val="accent2"/>
+          </a:lnRef>
+          <a:fillRef idx="2">
+            <a:schemeClr val="accent2"/>
+          </a:fillRef>
+          <a:effectRef idx="1">
+            <a:schemeClr val="accent2"/>
+          </a:effectRef>
+          <a:fontRef idx="minor">
+            <a:schemeClr val="dk1"/>
+          </a:fontRef>
+        </p:style>
+        <p:txBody>
+          <a:bodyPr rtlCol="0" anchor="ctr"/>
+          <a:lstStyle/>
+          <a:p>
+            <a:pPr algn="ctr"/>
+            <a:r>
+              <a:rPr lang="en-US" sz="1600" dirty="0">
+                <a:solidFill>
+                  <a:schemeClr val="bg1"/>
+                </a:solidFill>
+              </a:rPr>
+              <a:t>:Model</a:t>
+            </a:r>
+            <a:endParaRPr lang="en-SG" sz="1600" dirty="0">
+              <a:solidFill>
+                <a:schemeClr val="bg1"/>
+              </a:solidFill>
+            </a:endParaRPr>
+          </a:p>
+        </p:txBody>
+      </p:sp>
+      <p:cxnSp>
+        <p:nvCxnSpPr>
+          <p:cNvPr id="62" name="Straight Connector 4">
+            <a:extLst>
+              <a:ext uri="{FF2B5EF4-FFF2-40B4-BE49-F238E27FC236}">
+                <a16:creationId xmlns:a16="http://schemas.microsoft.com/office/drawing/2014/main" id="{C00E104F-6CE6-45F7-A4DB-E34099537D83}"/>
+              </a:ext>
+            </a:extLst>
+          </p:cNvPr>
+          <p:cNvCxnSpPr>
+            <a:cxnSpLocks/>
+          </p:cNvCxnSpPr>
+          <p:nvPr/>
+        </p:nvCxnSpPr>
+        <p:spPr>
+          <a:xfrm>
+            <a:off x="11275925" y="77605"/>
+            <a:ext cx="0" cy="5819103"/>
+          </a:xfrm>
+          <a:prstGeom prst="line">
+            <a:avLst/>
+          </a:prstGeom>
+          <a:ln w="19050">
+            <a:solidFill>
+              <a:srgbClr val="7030A0"/>
+            </a:solidFill>
+            <a:prstDash val="sysDash"/>
+          </a:ln>
+          <a:effectLst/>
+        </p:spPr>
+        <p:style>
+          <a:lnRef idx="1">
+            <a:schemeClr val="accent1"/>
+          </a:lnRef>
+          <a:fillRef idx="2">
+            <a:schemeClr val="accent1"/>
+          </a:fillRef>
+          <a:effectRef idx="1">
+            <a:schemeClr val="accent1"/>
+          </a:effectRef>
+          <a:fontRef idx="minor">
+            <a:schemeClr val="dk1"/>
+          </a:fontRef>
+        </p:style>
+      </p:cxnSp>
+      <p:sp>
+        <p:nvSpPr>
+          <p:cNvPr id="66" name="Rectangle 44">
+            <a:extLst>
+              <a:ext uri="{FF2B5EF4-FFF2-40B4-BE49-F238E27FC236}">
+                <a16:creationId xmlns:a16="http://schemas.microsoft.com/office/drawing/2014/main" id="{7D85F66B-05C8-4FE3-8002-58E0AC8DC7F0}"/>
+              </a:ext>
+            </a:extLst>
+          </p:cNvPr>
+          <p:cNvSpPr/>
+          <p:nvPr/>
+        </p:nvSpPr>
+        <p:spPr>
+          <a:xfrm>
+            <a:off x="11173012" y="4317174"/>
+            <a:ext cx="205843" cy="265984"/>
+          </a:xfrm>
+          <a:prstGeom prst="rect">
+            <a:avLst/>
+          </a:prstGeom>
+          <a:solidFill>
+            <a:srgbClr val="7030A0"/>
+          </a:solidFill>
+          <a:ln>
+            <a:solidFill>
+              <a:srgbClr val="7030A0"/>
+            </a:solidFill>
+          </a:ln>
+          <a:effectLst/>
+        </p:spPr>
+        <p:style>
+          <a:lnRef idx="1">
+            <a:schemeClr val="accent3"/>
+          </a:lnRef>
+          <a:fillRef idx="2">
+            <a:schemeClr val="accent3"/>
+          </a:fillRef>
+          <a:effectRef idx="1">
+            <a:schemeClr val="accent3"/>
+          </a:effectRef>
+          <a:fontRef idx="minor">
+            <a:schemeClr val="dk1"/>
+          </a:fontRef>
+        </p:style>
+        <p:txBody>
+          <a:bodyPr rtlCol="0" anchor="ctr"/>
+          <a:lstStyle/>
+          <a:p>
+            <a:pPr algn="ctr"/>
+            <a:endParaRPr lang="en-SG" sz="1400" dirty="0"/>
+          </a:p>
+        </p:txBody>
+      </p:sp>
+      <p:cxnSp>
+        <p:nvCxnSpPr>
+          <p:cNvPr id="67" name="Straight Arrow Connector 62">
+            <a:extLst>
+              <a:ext uri="{FF2B5EF4-FFF2-40B4-BE49-F238E27FC236}">
+                <a16:creationId xmlns:a16="http://schemas.microsoft.com/office/drawing/2014/main" id="{2E769EB8-141F-453A-9D98-71C4DD88068A}"/>
+              </a:ext>
+            </a:extLst>
+          </p:cNvPr>
+          <p:cNvCxnSpPr>
+            <a:cxnSpLocks/>
+          </p:cNvCxnSpPr>
+          <p:nvPr/>
+        </p:nvCxnSpPr>
+        <p:spPr>
+          <a:xfrm>
+            <a:off x="8899457" y="4598006"/>
+            <a:ext cx="2272106" cy="1"/>
+          </a:xfrm>
+          <a:prstGeom prst="straightConnector1">
+            <a:avLst/>
+          </a:prstGeom>
+          <a:ln w="19050">
+            <a:solidFill>
+              <a:srgbClr val="7030A0"/>
+            </a:solidFill>
+            <a:prstDash val="sysDash"/>
+            <a:headEnd type="arrow" w="med" len="med"/>
+            <a:tailEnd type="none" w="med" len="med"/>
+          </a:ln>
+        </p:spPr>
+        <p:style>
+          <a:lnRef idx="1">
+            <a:schemeClr val="accent1"/>
+          </a:lnRef>
+          <a:fillRef idx="0">
+            <a:schemeClr val="accent1"/>
+          </a:fillRef>
+          <a:effectRef idx="0">
+            <a:schemeClr val="accent1"/>
+          </a:effectRef>
+          <a:fontRef idx="minor">
+            <a:schemeClr val="tx1"/>
+          </a:fontRef>
+        </p:style>
+      </p:cxnSp>
+      <p:cxnSp>
+        <p:nvCxnSpPr>
+          <p:cNvPr id="69" name="Straight Arrow Connector 7">
+            <a:extLst>
+              <a:ext uri="{FF2B5EF4-FFF2-40B4-BE49-F238E27FC236}">
+                <a16:creationId xmlns:a16="http://schemas.microsoft.com/office/drawing/2014/main" id="{2DAAF787-853D-4EB2-BEDE-AADF340A2BB7}"/>
+              </a:ext>
+            </a:extLst>
+          </p:cNvPr>
+          <p:cNvCxnSpPr>
+            <a:cxnSpLocks/>
+          </p:cNvCxnSpPr>
+          <p:nvPr/>
+        </p:nvCxnSpPr>
+        <p:spPr>
+          <a:xfrm>
+            <a:off x="8899457" y="4323706"/>
+            <a:ext cx="2273555" cy="0"/>
+          </a:xfrm>
+          <a:prstGeom prst="straightConnector1">
+            <a:avLst/>
+          </a:prstGeom>
+          <a:ln w="19050">
+            <a:headEnd type="none" w="med" len="med"/>
+            <a:tailEnd type="arrow" w="med" len="med"/>
+          </a:ln>
+        </p:spPr>
+        <p:style>
+          <a:lnRef idx="1">
+            <a:schemeClr val="accent1"/>
+          </a:lnRef>
+          <a:fillRef idx="0">
+            <a:schemeClr val="accent1"/>
+          </a:fillRef>
+          <a:effectRef idx="0">
+            <a:schemeClr val="accent1"/>
+          </a:effectRef>
+          <a:fontRef idx="minor">
+            <a:schemeClr val="tx1"/>
+          </a:fontRef>
+        </p:style>
+      </p:cxnSp>
+      <p:sp>
+        <p:nvSpPr>
+          <p:cNvPr id="70" name="TextBox 79">
+            <a:extLst>
+              <a:ext uri="{FF2B5EF4-FFF2-40B4-BE49-F238E27FC236}">
+                <a16:creationId xmlns:a16="http://schemas.microsoft.com/office/drawing/2014/main" id="{4D39A41D-59F3-4D0F-9808-255757C8AB41}"/>
+              </a:ext>
+            </a:extLst>
+          </p:cNvPr>
+          <p:cNvSpPr txBox="1"/>
+          <p:nvPr/>
+        </p:nvSpPr>
+        <p:spPr>
+          <a:xfrm>
+            <a:off x="8945117" y="4076932"/>
+            <a:ext cx="2151229" cy="184666"/>
+          </a:xfrm>
+          <a:prstGeom prst="rect">
+            <a:avLst/>
+          </a:prstGeom>
+          <a:noFill/>
+        </p:spPr>
+        <p:txBody>
+          <a:bodyPr wrap="square" lIns="0" tIns="0" rIns="0" bIns="0" rtlCol="0">
+            <a:spAutoFit/>
+          </a:bodyPr>
+          <a:lstStyle>
+            <a:defPPr>
+              <a:defRPr lang="en-US"/>
+            </a:defPPr>
+            <a:lvl1pPr algn="r">
+              <a:defRPr sz="1400">
+                <a:solidFill>
+                  <a:srgbClr val="0070C0"/>
+                </a:solidFill>
+              </a:defRPr>
+            </a:lvl1pPr>
+          </a:lstStyle>
+          <a:p>
+            <a:pPr algn="ctr"/>
+            <a:r>
+              <a:rPr lang="en-US" sz="1200" dirty="0" err="1">
+                <a:solidFill>
+                  <a:srgbClr val="7030A0"/>
+                </a:solidFill>
+              </a:rPr>
+              <a:t>updateRecordSummary</a:t>
+            </a:r>
+            <a:r>
+              <a:rPr lang="en-US" sz="1200" dirty="0">
+                <a:solidFill>
+                  <a:srgbClr val="7030A0"/>
+                </a:solidFill>
+              </a:rPr>
+              <a:t>(predicate)</a:t>
+            </a:r>
+          </a:p>
+        </p:txBody>
+      </p:sp>
+      <p:sp>
+        <p:nvSpPr>
+          <p:cNvPr id="71" name="Rectangle 44">
+            <a:extLst>
+              <a:ext uri="{FF2B5EF4-FFF2-40B4-BE49-F238E27FC236}">
+                <a16:creationId xmlns:a16="http://schemas.microsoft.com/office/drawing/2014/main" id="{A28AE276-DD04-49B8-A003-B8FA663B96D5}"/>
+              </a:ext>
+            </a:extLst>
+          </p:cNvPr>
+          <p:cNvSpPr/>
+          <p:nvPr/>
+        </p:nvSpPr>
+        <p:spPr>
+          <a:xfrm>
+            <a:off x="11173012" y="4986535"/>
+            <a:ext cx="205843" cy="265984"/>
+          </a:xfrm>
+          <a:prstGeom prst="rect">
+            <a:avLst/>
+          </a:prstGeom>
+          <a:solidFill>
+            <a:srgbClr val="7030A0"/>
+          </a:solidFill>
+          <a:ln>
+            <a:solidFill>
+              <a:srgbClr val="7030A0"/>
+            </a:solidFill>
+          </a:ln>
+          <a:effectLst/>
+        </p:spPr>
+        <p:style>
+          <a:lnRef idx="1">
+            <a:schemeClr val="accent3"/>
+          </a:lnRef>
+          <a:fillRef idx="2">
+            <a:schemeClr val="accent3"/>
+          </a:fillRef>
+          <a:effectRef idx="1">
+            <a:schemeClr val="accent3"/>
+          </a:effectRef>
+          <a:fontRef idx="minor">
+            <a:schemeClr val="dk1"/>
+          </a:fontRef>
+        </p:style>
+        <p:txBody>
+          <a:bodyPr rtlCol="0" anchor="ctr"/>
+          <a:lstStyle/>
+          <a:p>
+            <a:pPr algn="ctr"/>
+            <a:endParaRPr lang="en-SG" sz="1400" dirty="0"/>
+          </a:p>
+        </p:txBody>
+      </p:sp>
+      <p:cxnSp>
+        <p:nvCxnSpPr>
+          <p:cNvPr id="72" name="Straight Arrow Connector 62">
+            <a:extLst>
+              <a:ext uri="{FF2B5EF4-FFF2-40B4-BE49-F238E27FC236}">
+                <a16:creationId xmlns:a16="http://schemas.microsoft.com/office/drawing/2014/main" id="{3E2F3DAB-5AF7-40A2-A7C8-CC15A79A23B3}"/>
+              </a:ext>
+            </a:extLst>
+          </p:cNvPr>
+          <p:cNvCxnSpPr>
+            <a:cxnSpLocks/>
+          </p:cNvCxnSpPr>
+          <p:nvPr/>
+        </p:nvCxnSpPr>
+        <p:spPr>
+          <a:xfrm>
+            <a:off x="8899457" y="5267367"/>
+            <a:ext cx="2272106" cy="1"/>
+          </a:xfrm>
+          <a:prstGeom prst="straightConnector1">
+            <a:avLst/>
+          </a:prstGeom>
+          <a:ln w="19050">
+            <a:solidFill>
+              <a:srgbClr val="7030A0"/>
+            </a:solidFill>
+            <a:prstDash val="sysDash"/>
+            <a:headEnd type="arrow" w="med" len="med"/>
+            <a:tailEnd type="none" w="med" len="med"/>
+          </a:ln>
+        </p:spPr>
+        <p:style>
+          <a:lnRef idx="1">
+            <a:schemeClr val="accent1"/>
+          </a:lnRef>
+          <a:fillRef idx="0">
+            <a:schemeClr val="accent1"/>
+          </a:fillRef>
+          <a:effectRef idx="0">
+            <a:schemeClr val="accent1"/>
+          </a:effectRef>
+          <a:fontRef idx="minor">
+            <a:schemeClr val="tx1"/>
+          </a:fontRef>
+        </p:style>
+      </p:cxnSp>
+      <p:cxnSp>
+        <p:nvCxnSpPr>
+          <p:cNvPr id="73" name="Straight Arrow Connector 7">
+            <a:extLst>
+              <a:ext uri="{FF2B5EF4-FFF2-40B4-BE49-F238E27FC236}">
+                <a16:creationId xmlns:a16="http://schemas.microsoft.com/office/drawing/2014/main" id="{E2612CDB-5AA5-4DE4-B73F-CBD638B9EA97}"/>
+              </a:ext>
+            </a:extLst>
+          </p:cNvPr>
+          <p:cNvCxnSpPr>
+            <a:cxnSpLocks/>
+          </p:cNvCxnSpPr>
+          <p:nvPr/>
+        </p:nvCxnSpPr>
+        <p:spPr>
+          <a:xfrm>
+            <a:off x="8899457" y="4993067"/>
+            <a:ext cx="2273555" cy="0"/>
+          </a:xfrm>
+          <a:prstGeom prst="straightConnector1">
+            <a:avLst/>
+          </a:prstGeom>
+          <a:ln w="19050">
+            <a:headEnd type="none" w="med" len="med"/>
+            <a:tailEnd type="arrow" w="med" len="med"/>
+          </a:ln>
+        </p:spPr>
+        <p:style>
+          <a:lnRef idx="1">
+            <a:schemeClr val="accent1"/>
+          </a:lnRef>
+          <a:fillRef idx="0">
+            <a:schemeClr val="accent1"/>
+          </a:fillRef>
+          <a:effectRef idx="0">
+            <a:schemeClr val="accent1"/>
+          </a:effectRef>
+          <a:fontRef idx="minor">
+            <a:schemeClr val="tx1"/>
+          </a:fontRef>
+        </p:style>
+      </p:cxnSp>
+      <p:sp>
+        <p:nvSpPr>
+          <p:cNvPr id="74" name="TextBox 79">
+            <a:extLst>
+              <a:ext uri="{FF2B5EF4-FFF2-40B4-BE49-F238E27FC236}">
+                <a16:creationId xmlns:a16="http://schemas.microsoft.com/office/drawing/2014/main" id="{6CBC026B-C690-4082-A463-AFFA8A58A730}"/>
+              </a:ext>
+            </a:extLst>
+          </p:cNvPr>
+          <p:cNvSpPr txBox="1"/>
+          <p:nvPr/>
+        </p:nvSpPr>
+        <p:spPr>
+          <a:xfrm>
+            <a:off x="8929840" y="4771786"/>
+            <a:ext cx="2151229" cy="184666"/>
+          </a:xfrm>
+          <a:prstGeom prst="rect">
+            <a:avLst/>
+          </a:prstGeom>
+          <a:noFill/>
+        </p:spPr>
+        <p:txBody>
+          <a:bodyPr wrap="square" lIns="0" tIns="0" rIns="0" bIns="0" rtlCol="0">
+            <a:spAutoFit/>
+          </a:bodyPr>
+          <a:lstStyle>
+            <a:defPPr>
+              <a:defRPr lang="en-US"/>
+            </a:defPPr>
+            <a:lvl1pPr algn="r">
+              <a:defRPr sz="1400">
+                <a:solidFill>
+                  <a:srgbClr val="0070C0"/>
+                </a:solidFill>
+              </a:defRPr>
+            </a:lvl1pPr>
+          </a:lstStyle>
+          <a:p>
+            <a:pPr algn="ctr"/>
+            <a:r>
+              <a:rPr lang="en-US" sz="1200" dirty="0" err="1">
+                <a:solidFill>
+                  <a:srgbClr val="7030A0"/>
+                </a:solidFill>
+              </a:rPr>
+              <a:t>updateSummaryPeriod</a:t>
+            </a:r>
+            <a:r>
+              <a:rPr lang="en-US" sz="1200" dirty="0">
+                <a:solidFill>
+                  <a:srgbClr val="7030A0"/>
+                </a:solidFill>
+              </a:rPr>
+              <a:t>(period)</a:t>
+            </a:r>
+          </a:p>
+        </p:txBody>
+      </p:sp>
+      <p:sp>
+        <p:nvSpPr>
+          <p:cNvPr id="75" name="Rectangle 44">
+            <a:extLst>
+              <a:ext uri="{FF2B5EF4-FFF2-40B4-BE49-F238E27FC236}">
+                <a16:creationId xmlns:a16="http://schemas.microsoft.com/office/drawing/2014/main" id="{EF073B95-D309-43FC-90E2-2C43434C17E7}"/>
+              </a:ext>
+            </a:extLst>
+          </p:cNvPr>
+          <p:cNvSpPr/>
+          <p:nvPr/>
+        </p:nvSpPr>
+        <p:spPr>
+          <a:xfrm>
+            <a:off x="11173012" y="5629317"/>
+            <a:ext cx="205843" cy="265984"/>
+          </a:xfrm>
+          <a:prstGeom prst="rect">
+            <a:avLst/>
+          </a:prstGeom>
+          <a:solidFill>
+            <a:srgbClr val="7030A0"/>
+          </a:solidFill>
+          <a:ln>
+            <a:solidFill>
+              <a:srgbClr val="7030A0"/>
+            </a:solidFill>
+          </a:ln>
+          <a:effectLst/>
+        </p:spPr>
+        <p:style>
+          <a:lnRef idx="1">
+            <a:schemeClr val="accent3"/>
+          </a:lnRef>
+          <a:fillRef idx="2">
+            <a:schemeClr val="accent3"/>
+          </a:fillRef>
+          <a:effectRef idx="1">
+            <a:schemeClr val="accent3"/>
+          </a:effectRef>
+          <a:fontRef idx="minor">
+            <a:schemeClr val="dk1"/>
+          </a:fontRef>
+        </p:style>
+        <p:txBody>
+          <a:bodyPr rtlCol="0" anchor="ctr"/>
+          <a:lstStyle/>
+          <a:p>
+            <a:pPr algn="ctr"/>
+            <a:endParaRPr lang="en-SG" sz="1400" dirty="0"/>
+          </a:p>
+        </p:txBody>
+      </p:sp>
+      <p:cxnSp>
+        <p:nvCxnSpPr>
+          <p:cNvPr id="77" name="Straight Arrow Connector 62">
+            <a:extLst>
+              <a:ext uri="{FF2B5EF4-FFF2-40B4-BE49-F238E27FC236}">
+                <a16:creationId xmlns:a16="http://schemas.microsoft.com/office/drawing/2014/main" id="{2F577090-3B19-4416-9582-F71E1805CB85}"/>
+              </a:ext>
+            </a:extLst>
+          </p:cNvPr>
+          <p:cNvCxnSpPr>
+            <a:cxnSpLocks/>
+          </p:cNvCxnSpPr>
+          <p:nvPr/>
+        </p:nvCxnSpPr>
+        <p:spPr>
+          <a:xfrm>
+            <a:off x="8899457" y="5910149"/>
+            <a:ext cx="2272106" cy="1"/>
+          </a:xfrm>
+          <a:prstGeom prst="straightConnector1">
+            <a:avLst/>
+          </a:prstGeom>
+          <a:ln w="19050">
+            <a:solidFill>
+              <a:srgbClr val="7030A0"/>
+            </a:solidFill>
+            <a:prstDash val="sysDash"/>
+            <a:headEnd type="arrow" w="med" len="med"/>
+            <a:tailEnd type="none" w="med" len="med"/>
+          </a:ln>
+        </p:spPr>
+        <p:style>
+          <a:lnRef idx="1">
+            <a:schemeClr val="accent1"/>
+          </a:lnRef>
+          <a:fillRef idx="0">
+            <a:schemeClr val="accent1"/>
+          </a:fillRef>
+          <a:effectRef idx="0">
+            <a:schemeClr val="accent1"/>
+          </a:effectRef>
+          <a:fontRef idx="minor">
+            <a:schemeClr val="tx1"/>
+          </a:fontRef>
+        </p:style>
+      </p:cxnSp>
+      <p:cxnSp>
+        <p:nvCxnSpPr>
+          <p:cNvPr id="78" name="Straight Arrow Connector 7">
+            <a:extLst>
+              <a:ext uri="{FF2B5EF4-FFF2-40B4-BE49-F238E27FC236}">
+                <a16:creationId xmlns:a16="http://schemas.microsoft.com/office/drawing/2014/main" id="{B1A93AF7-48D1-4C18-8D73-9FC4496CACC7}"/>
+              </a:ext>
+            </a:extLst>
+          </p:cNvPr>
+          <p:cNvCxnSpPr>
+            <a:cxnSpLocks/>
+          </p:cNvCxnSpPr>
+          <p:nvPr/>
+        </p:nvCxnSpPr>
+        <p:spPr>
+          <a:xfrm>
+            <a:off x="8899457" y="5635849"/>
+            <a:ext cx="2273555" cy="0"/>
+          </a:xfrm>
+          <a:prstGeom prst="straightConnector1">
+            <a:avLst/>
+          </a:prstGeom>
+          <a:ln w="19050">
+            <a:headEnd type="none" w="med" len="med"/>
+            <a:tailEnd type="arrow" w="med" len="med"/>
+          </a:ln>
+        </p:spPr>
+        <p:style>
+          <a:lnRef idx="1">
+            <a:schemeClr val="accent1"/>
+          </a:lnRef>
+          <a:fillRef idx="0">
+            <a:schemeClr val="accent1"/>
+          </a:fillRef>
+          <a:effectRef idx="0">
+            <a:schemeClr val="accent1"/>
+          </a:effectRef>
+          <a:fontRef idx="minor">
+            <a:schemeClr val="tx1"/>
+          </a:fontRef>
+        </p:style>
+      </p:cxnSp>
+      <p:sp>
+        <p:nvSpPr>
+          <p:cNvPr id="79" name="TextBox 79">
+            <a:extLst>
+              <a:ext uri="{FF2B5EF4-FFF2-40B4-BE49-F238E27FC236}">
+                <a16:creationId xmlns:a16="http://schemas.microsoft.com/office/drawing/2014/main" id="{F0C4BC2D-87B6-4922-A059-AF59181FE3FE}"/>
+              </a:ext>
+            </a:extLst>
+          </p:cNvPr>
+          <p:cNvSpPr txBox="1"/>
+          <p:nvPr/>
+        </p:nvSpPr>
+        <p:spPr>
+          <a:xfrm>
+            <a:off x="8945117" y="5272295"/>
+            <a:ext cx="2151229" cy="369332"/>
+          </a:xfrm>
+          <a:prstGeom prst="rect">
+            <a:avLst/>
+          </a:prstGeom>
+          <a:noFill/>
+        </p:spPr>
+        <p:txBody>
+          <a:bodyPr wrap="square" lIns="0" tIns="0" rIns="0" bIns="0" rtlCol="0">
+            <a:spAutoFit/>
+          </a:bodyPr>
+          <a:lstStyle>
+            <a:defPPr>
+              <a:defRPr lang="en-US"/>
+            </a:defPPr>
+            <a:lvl1pPr algn="r">
+              <a:defRPr sz="1400">
+                <a:solidFill>
+                  <a:srgbClr val="0070C0"/>
+                </a:solidFill>
+              </a:defRPr>
+            </a:lvl1pPr>
+          </a:lstStyle>
+          <a:p>
+            <a:pPr algn="ctr"/>
+            <a:r>
+              <a:rPr lang="en-US" sz="1200" dirty="0" err="1">
+                <a:solidFill>
+                  <a:srgbClr val="7030A0"/>
+                </a:solidFill>
+              </a:rPr>
+              <a:t>updatePeriodAmount</a:t>
+            </a:r>
+            <a:br>
+              <a:rPr lang="en-US" sz="1200" dirty="0">
+                <a:solidFill>
+                  <a:srgbClr val="7030A0"/>
+                </a:solidFill>
+              </a:rPr>
+            </a:br>
+            <a:r>
+              <a:rPr lang="en-US" sz="1200" dirty="0">
+                <a:solidFill>
+                  <a:srgbClr val="7030A0"/>
+                </a:solidFill>
+              </a:rPr>
+              <a:t>(</a:t>
+            </a:r>
+            <a:r>
+              <a:rPr lang="en-US" sz="1200" dirty="0" err="1">
+                <a:solidFill>
+                  <a:srgbClr val="7030A0"/>
+                </a:solidFill>
+              </a:rPr>
+              <a:t>periodAmount</a:t>
+            </a:r>
+            <a:r>
+              <a:rPr lang="en-US" sz="1200" dirty="0">
+                <a:solidFill>
+                  <a:srgbClr val="7030A0"/>
+                </a:solidFill>
+              </a:rPr>
+              <a:t>)</a:t>
             </a:r>
           </a:p>
         </p:txBody>

</xml_diff>